<commit_message>
Powerpoint writer: avoid extra blank lines before author.
(In the case where there is no subtitle.)

Closes #10619.
</commit_message>
<xml_diff>
--- a/test/pptx/document-properties-short-desc/templated.pptx
+++ b/test/pptx/document-properties-short-desc/templated.pptx
@@ -5745,7 +5745,7 @@
           <a:bodyPr/>
           <a:lstStyle/>
           <a:p>
-            <a:pPr lvl="0" marL="0" indent="0">
+            <a:pPr lvl="0" indent="0" marL="0">
               <a:buNone/>
             </a:pPr>
             <a:r>
@@ -5775,11 +5775,9 @@
           <a:bodyPr/>
           <a:lstStyle/>
           <a:p>
-            <a:pPr lvl="0" marL="0" indent="0">
+            <a:pPr lvl="0" indent="0" marL="0">
               <a:buNone/>
             </a:pPr>
-            <a:br/>
-            <a:br/>
             <a:r>
               <a:rPr/>
               <a:t>A. M.</a:t>
@@ -5824,7 +5822,7 @@
           <a:bodyPr/>
           <a:lstStyle/>
           <a:p>
-            <a:pPr lvl="0" marL="0" indent="0">
+            <a:pPr lvl="0" indent="0" marL="0">
               <a:buNone/>
             </a:pPr>
             <a:r>

</xml_diff>